<commit_message>
Finished testing the screen and fiducial calibration protocol
</commit_message>
<xml_diff>
--- a/calibration.screenFiducial/Experimental Setup (calibration.screenFiducial).pptx
+++ b/calibration.screenFiducial/Experimental Setup (calibration.screenFiducial).pptx
@@ -6,6 +6,7 @@
   </p:sldMasterIdLst>
   <p:sldIdLst>
     <p:sldId id="256" r:id="rId5"/>
+    <p:sldId id="257" r:id="rId6"/>
   </p:sldIdLst>
   <p:sldSz cx="21601113" cy="14400213"/>
   <p:notesSz cx="9144000" cy="6858000"/>
@@ -4207,6 +4208,118 @@
 </p:sld>
 </file>
 
+<file path=ppt/slides/slide2.xml><?xml version="1.0" encoding="utf-8"?>
+<p:sld xmlns:a="http://schemas.openxmlformats.org/drawingml/2006/main" xmlns:r="http://schemas.openxmlformats.org/officeDocument/2006/relationships" xmlns:p="http://schemas.openxmlformats.org/presentationml/2006/main">
+  <p:cSld>
+    <p:spTree>
+      <p:nvGrpSpPr>
+        <p:cNvPr id="1" name=""/>
+        <p:cNvGrpSpPr/>
+        <p:nvPr/>
+      </p:nvGrpSpPr>
+      <p:grpSpPr>
+        <a:xfrm>
+          <a:off x="0" y="0"/>
+          <a:ext cx="0" cy="0"/>
+          <a:chOff x="0" y="0"/>
+          <a:chExt cx="0" cy="0"/>
+        </a:xfrm>
+      </p:grpSpPr>
+      <p:pic>
+        <p:nvPicPr>
+          <p:cNvPr id="2" name="Picture 1">
+            <a:extLst>
+              <a:ext uri="{FF2B5EF4-FFF2-40B4-BE49-F238E27FC236}">
+                <a16:creationId xmlns:a16="http://schemas.microsoft.com/office/drawing/2014/main" id="{DD396993-88D2-1EB8-B188-2766928CB5F0}"/>
+              </a:ext>
+            </a:extLst>
+          </p:cNvPr>
+          <p:cNvPicPr>
+            <a:picLocks noChangeAspect="1"/>
+          </p:cNvPicPr>
+          <p:nvPr/>
+        </p:nvPicPr>
+        <p:blipFill>
+          <a:blip r:embed="rId2"/>
+          <a:stretch>
+            <a:fillRect/>
+          </a:stretch>
+        </p:blipFill>
+        <p:spPr>
+          <a:xfrm>
+            <a:off x="7687151" y="5291296"/>
+            <a:ext cx="5731510" cy="3398520"/>
+          </a:xfrm>
+          <a:prstGeom prst="rect">
+            <a:avLst/>
+          </a:prstGeom>
+        </p:spPr>
+      </p:pic>
+      <p:sp>
+        <p:nvSpPr>
+          <p:cNvPr id="3" name="Rectangle 2">
+            <a:extLst>
+              <a:ext uri="{FF2B5EF4-FFF2-40B4-BE49-F238E27FC236}">
+                <a16:creationId xmlns:a16="http://schemas.microsoft.com/office/drawing/2014/main" id="{133BD3DE-1BBE-BC87-9905-EF75FCA7BD5E}"/>
+              </a:ext>
+            </a:extLst>
+          </p:cNvPr>
+          <p:cNvSpPr/>
+          <p:nvPr/>
+        </p:nvSpPr>
+        <p:spPr>
+          <a:xfrm>
+            <a:off x="7727950" y="5581650"/>
+            <a:ext cx="1803400" cy="469900"/>
+          </a:xfrm>
+          <a:prstGeom prst="rect">
+            <a:avLst/>
+          </a:prstGeom>
+          <a:solidFill>
+            <a:srgbClr val="1C2127"/>
+          </a:solidFill>
+          <a:ln>
+            <a:noFill/>
+          </a:ln>
+        </p:spPr>
+        <p:style>
+          <a:lnRef idx="2">
+            <a:schemeClr val="accent1">
+              <a:shade val="15000"/>
+            </a:schemeClr>
+          </a:lnRef>
+          <a:fillRef idx="1">
+            <a:schemeClr val="accent1"/>
+          </a:fillRef>
+          <a:effectRef idx="0">
+            <a:schemeClr val="accent1"/>
+          </a:effectRef>
+          <a:fontRef idx="minor">
+            <a:schemeClr val="lt1"/>
+          </a:fontRef>
+        </p:style>
+        <p:txBody>
+          <a:bodyPr rtlCol="0" anchor="ctr"/>
+          <a:lstStyle/>
+          <a:p>
+            <a:pPr algn="ctr"/>
+            <a:endParaRPr lang="en-DK"/>
+          </a:p>
+        </p:txBody>
+      </p:sp>
+    </p:spTree>
+    <p:extLst>
+      <p:ext uri="{BB962C8B-B14F-4D97-AF65-F5344CB8AC3E}">
+        <p14:creationId xmlns:p14="http://schemas.microsoft.com/office/powerpoint/2010/main" val="752897878"/>
+      </p:ext>
+    </p:extLst>
+  </p:cSld>
+  <p:clrMapOvr>
+    <a:masterClrMapping/>
+  </p:clrMapOvr>
+</p:sld>
+</file>
+
 <file path=ppt/theme/theme1.xml><?xml version="1.0" encoding="utf-8"?>
 <a:theme xmlns:a="http://schemas.openxmlformats.org/drawingml/2006/main" name="Office Theme">
   <a:themeElements>
@@ -4523,26 +4636,6 @@
 </file>
 
 <file path=customXml/item1.xml><?xml version="1.0" encoding="utf-8"?>
-<p:properties xmlns:p="http://schemas.microsoft.com/office/2006/metadata/properties" xmlns:xsi="http://www.w3.org/2001/XMLSchema-instance" xmlns:pc="http://schemas.microsoft.com/office/infopath/2007/PartnerControls">
-  <documentManagement>
-    <TaxCatchAll xmlns="6dfb7b4b-871d-4c24-9d42-16b14ecd044c" xsi:nil="true"/>
-    <lcf76f155ced4ddcb4097134ff3c332f xmlns="51c7d8ad-74c8-4833-8478-0d0a5cafce0c">
-      <Terms xmlns="http://schemas.microsoft.com/office/infopath/2007/PartnerControls"/>
-    </lcf76f155ced4ddcb4097134ff3c332f>
-  </documentManagement>
-</p:properties>
-</file>
-
-<file path=customXml/item2.xml><?xml version="1.0" encoding="utf-8"?>
-<?mso-contentType ?>
-<FormTemplates xmlns="http://schemas.microsoft.com/sharepoint/v3/contenttype/forms">
-  <Display>DocumentLibraryForm</Display>
-  <Edit>DocumentLibraryForm</Edit>
-  <New>DocumentLibraryForm</New>
-</FormTemplates>
-</file>
-
-<file path=customXml/item3.xml><?xml version="1.0" encoding="utf-8"?>
 <ct:contentTypeSchema xmlns:ct="http://schemas.microsoft.com/office/2006/metadata/contentType" xmlns:ma="http://schemas.microsoft.com/office/2006/metadata/properties/metaAttributes" ct:_="" ma:_="" ma:contentTypeName="Document" ma:contentTypeID="0x0101005B996248A2D0E04D87B9DBB54D269DA4" ma:contentTypeVersion="18" ma:contentTypeDescription="Create a new document." ma:contentTypeScope="" ma:versionID="f22bde94a6705f7f7e236c14bc19f189">
   <xsd:schema xmlns:xsd="http://www.w3.org/2001/XMLSchema" xmlns:xs="http://www.w3.org/2001/XMLSchema" xmlns:p="http://schemas.microsoft.com/office/2006/metadata/properties" xmlns:ns2="51c7d8ad-74c8-4833-8478-0d0a5cafce0c" xmlns:ns3="6dfb7b4b-871d-4c24-9d42-16b14ecd044c" targetNamespace="http://schemas.microsoft.com/office/2006/metadata/properties" ma:root="true" ma:fieldsID="273248db29f554cba2c15e8dd349c138" ns2:_="" ns3:_="">
     <xsd:import namespace="51c7d8ad-74c8-4833-8478-0d0a5cafce0c"/>
@@ -4797,26 +4890,27 @@
 </ct:contentTypeSchema>
 </file>
 
-<file path=customXml/itemProps1.xml><?xml version="1.0" encoding="utf-8"?>
-<ds:datastoreItem xmlns:ds="http://schemas.openxmlformats.org/officeDocument/2006/customXml" ds:itemID="{2EF670CE-B0AA-4D52-AFC6-AA4BF7D46EEA}">
-  <ds:schemaRefs>
-    <ds:schemaRef ds:uri="http://schemas.microsoft.com/office/2006/metadata/properties"/>
-    <ds:schemaRef ds:uri="http://schemas.microsoft.com/office/infopath/2007/PartnerControls"/>
-    <ds:schemaRef ds:uri="6dfb7b4b-871d-4c24-9d42-16b14ecd044c"/>
-    <ds:schemaRef ds:uri="51c7d8ad-74c8-4833-8478-0d0a5cafce0c"/>
-  </ds:schemaRefs>
-</ds:datastoreItem>
+<file path=customXml/item2.xml><?xml version="1.0" encoding="utf-8"?>
+<?mso-contentType ?>
+<FormTemplates xmlns="http://schemas.microsoft.com/sharepoint/v3/contenttype/forms">
+  <Display>DocumentLibraryForm</Display>
+  <Edit>DocumentLibraryForm</Edit>
+  <New>DocumentLibraryForm</New>
+</FormTemplates>
 </file>
 
-<file path=customXml/itemProps2.xml><?xml version="1.0" encoding="utf-8"?>
-<ds:datastoreItem xmlns:ds="http://schemas.openxmlformats.org/officeDocument/2006/customXml" ds:itemID="{EF875D47-8106-485E-98E0-D60C6A98DA6A}">
-  <ds:schemaRefs>
-    <ds:schemaRef ds:uri="http://schemas.microsoft.com/sharepoint/v3/contenttype/forms"/>
-  </ds:schemaRefs>
-</ds:datastoreItem>
+<file path=customXml/item3.xml><?xml version="1.0" encoding="utf-8"?>
+<p:properties xmlns:p="http://schemas.microsoft.com/office/2006/metadata/properties" xmlns:xsi="http://www.w3.org/2001/XMLSchema-instance" xmlns:pc="http://schemas.microsoft.com/office/infopath/2007/PartnerControls">
+  <documentManagement>
+    <TaxCatchAll xmlns="6dfb7b4b-871d-4c24-9d42-16b14ecd044c" xsi:nil="true"/>
+    <lcf76f155ced4ddcb4097134ff3c332f xmlns="51c7d8ad-74c8-4833-8478-0d0a5cafce0c">
+      <Terms xmlns="http://schemas.microsoft.com/office/infopath/2007/PartnerControls"/>
+    </lcf76f155ced4ddcb4097134ff3c332f>
+  </documentManagement>
+</p:properties>
 </file>
 
-<file path=customXml/itemProps3.xml><?xml version="1.0" encoding="utf-8"?>
+<file path=customXml/itemProps1.xml><?xml version="1.0" encoding="utf-8"?>
 <ds:datastoreItem xmlns:ds="http://schemas.openxmlformats.org/officeDocument/2006/customXml" ds:itemID="{172A1115-3E72-42E2-A544-7EAA53D3702E}">
   <ds:schemaRefs>
     <ds:schemaRef ds:uri="http://schemas.microsoft.com/office/2006/metadata/contentType"/>
@@ -4833,4 +4927,23 @@
     <ds:schemaRef ds:uri="http://schemas.microsoft.com/internal/obd"/>
   </ds:schemaRefs>
 </ds:datastoreItem>
+</file>
+
+<file path=customXml/itemProps2.xml><?xml version="1.0" encoding="utf-8"?>
+<ds:datastoreItem xmlns:ds="http://schemas.openxmlformats.org/officeDocument/2006/customXml" ds:itemID="{EF875D47-8106-485E-98E0-D60C6A98DA6A}">
+  <ds:schemaRefs>
+    <ds:schemaRef ds:uri="http://schemas.microsoft.com/sharepoint/v3/contenttype/forms"/>
+  </ds:schemaRefs>
+</ds:datastoreItem>
+</file>
+
+<file path=customXml/itemProps3.xml><?xml version="1.0" encoding="utf-8"?>
+<ds:datastoreItem xmlns:ds="http://schemas.openxmlformats.org/officeDocument/2006/customXml" ds:itemID="{2EF670CE-B0AA-4D52-AFC6-AA4BF7D46EEA}">
+  <ds:schemaRefs>
+    <ds:schemaRef ds:uri="http://schemas.microsoft.com/office/2006/metadata/properties"/>
+    <ds:schemaRef ds:uri="http://schemas.microsoft.com/office/infopath/2007/PartnerControls"/>
+    <ds:schemaRef ds:uri="6dfb7b4b-871d-4c24-9d42-16b14ecd044c"/>
+    <ds:schemaRef ds:uri="51c7d8ad-74c8-4833-8478-0d0a5cafce0c"/>
+  </ds:schemaRefs>
+</ds:datastoreItem>
 </file>
</xml_diff>